<commit_message>
Uloha 4 insert table
</commit_message>
<xml_diff>
--- a/cvicenie_7/Lepsi_a_zdravsi_zivotný_stýl_vdaka_gamifikacii_Loch_121197.pptx
+++ b/cvicenie_7/Lepsi_a_zdravsi_zivotný_stýl_vdaka_gamifikacii_Loch_121197.pptx
@@ -113,6 +113,14 @@
       </a:defRPr>
     </a:lvl9pPr>
   </p:defaultTextStyle>
+  <p:extLst>
+    <p:ext uri="{EFAFB233-063F-42B5-8137-9DF3F51BA10A}">
+      <p15:sldGuideLst xmlns:p15="http://schemas.microsoft.com/office/powerpoint/2012/main"/>
+    </p:ext>
+    <p:ext uri="{2D200454-40CA-4A62-9FC3-DE9A4176ACB9}">
+      <p15:notesGuideLst xmlns:p15="http://schemas.microsoft.com/office/powerpoint/2012/main"/>
+    </p:ext>
+  </p:extLst>
 </p:presentation>
 </file>
 
@@ -5037,6 +5045,69 @@
           </a:p>
         </p:txBody>
       </p:sp>
+      <p:graphicFrame>
+        <p:nvGraphicFramePr>
+          <p:cNvPr id="8" name="Objekt 7">
+            <a:extLst>
+              <a:ext uri="{FF2B5EF4-FFF2-40B4-BE49-F238E27FC236}">
+                <a16:creationId xmlns:a16="http://schemas.microsoft.com/office/drawing/2014/main" id="{6EB961BE-5EB4-5A09-2C75-A3D0FF58BEB1}"/>
+              </a:ext>
+            </a:extLst>
+          </p:cNvPr>
+          <p:cNvGraphicFramePr>
+            <a:graphicFrameLocks noChangeAspect="1"/>
+          </p:cNvGraphicFramePr>
+          <p:nvPr>
+            <p:extLst>
+              <p:ext uri="{D42A27DB-BD31-4B8C-83A1-F6EECF244321}">
+                <p14:modId xmlns:p14="http://schemas.microsoft.com/office/powerpoint/2010/main" val="2139290172"/>
+              </p:ext>
+            </p:extLst>
+          </p:nvPr>
+        </p:nvGraphicFramePr>
+        <p:xfrm>
+          <a:off x="1704736" y="2020289"/>
+          <a:ext cx="4988950" cy="3230322"/>
+        </p:xfrm>
+        <a:graphic>
+          <a:graphicData uri="http://schemas.openxmlformats.org/presentationml/2006/ole">
+            <mc:AlternateContent xmlns:mc="http://schemas.openxmlformats.org/markup-compatibility/2006">
+              <mc:Choice xmlns:v="urn:schemas-microsoft-com:vml" Requires="v">
+                <p:oleObj name="Worksheet" r:id="rId2" imgW="3422634" imgH="2216277" progId="Excel.Sheet.12">
+                  <p:embed/>
+                </p:oleObj>
+              </mc:Choice>
+              <mc:Fallback>
+                <p:oleObj name="Worksheet" r:id="rId2" imgW="3422634" imgH="2216277" progId="Excel.Sheet.12">
+                  <p:embed/>
+                  <p:pic>
+                    <p:nvPicPr>
+                      <p:cNvPr id="0" name=""/>
+                      <p:cNvPicPr/>
+                      <p:nvPr/>
+                    </p:nvPicPr>
+                    <p:blipFill>
+                      <a:blip r:embed="rId3"/>
+                      <a:stretch>
+                        <a:fillRect/>
+                      </a:stretch>
+                    </p:blipFill>
+                    <p:spPr>
+                      <a:xfrm>
+                        <a:off x="1704736" y="2020289"/>
+                        <a:ext cx="4988950" cy="3230322"/>
+                      </a:xfrm>
+                      <a:prstGeom prst="rect">
+                        <a:avLst/>
+                      </a:prstGeom>
+                    </p:spPr>
+                  </p:pic>
+                </p:oleObj>
+              </mc:Fallback>
+            </mc:AlternateContent>
+          </a:graphicData>
+        </a:graphic>
+      </p:graphicFrame>
     </p:spTree>
     <p:extLst>
       <p:ext uri="{BB962C8B-B14F-4D97-AF65-F5344CB8AC3E}">

</xml_diff>

<commit_message>
Oprava ulohy 1 a 2
</commit_message>
<xml_diff>
--- a/cvicenie_7/Lepsi_a_zdravsi_zivotný_stýl_vdaka_gamifikacii_Loch_121197.pptx
+++ b/cvicenie_7/Lepsi_a_zdravsi_zivotný_stýl_vdaka_gamifikacii_Loch_121197.pptx
@@ -5210,6 +5210,47 @@
             <a:schemeClr val="lt1"/>
           </a:fontRef>
         </p:style>
+      </p:sp>
+      <p:sp>
+        <p:nvSpPr>
+          <p:cNvPr id="7" name="BlokTextu 6">
+            <a:extLst>
+              <a:ext uri="{FF2B5EF4-FFF2-40B4-BE49-F238E27FC236}">
+                <a16:creationId xmlns:a16="http://schemas.microsoft.com/office/drawing/2014/main" id="{2B46E58E-AF7B-D46C-7B6A-9AC7D3D9EA5D}"/>
+              </a:ext>
+            </a:extLst>
+          </p:cNvPr>
+          <p:cNvSpPr txBox="1"/>
+          <p:nvPr userDrawn="1"/>
+        </p:nvSpPr>
+        <p:spPr>
+          <a:xfrm>
+            <a:off x="2957146" y="166668"/>
+            <a:ext cx="6277708" cy="261610"/>
+          </a:xfrm>
+          <a:prstGeom prst="rect">
+            <a:avLst/>
+          </a:prstGeom>
+          <a:noFill/>
+        </p:spPr>
+        <p:txBody>
+          <a:bodyPr wrap="square" rtlCol="0">
+            <a:spAutoFit/>
+          </a:bodyPr>
+          <a:lstStyle/>
+          <a:p>
+            <a:pPr algn="ctr"/>
+            <a:r>
+              <a:rPr lang="sk-SK" sz="1100" dirty="0"/>
+              <a:t>Zdravší životný štýl vďaka </a:t>
+            </a:r>
+            <a:r>
+              <a:rPr lang="sk-SK" sz="1100" dirty="0" err="1"/>
+              <a:t>gamifikácií</a:t>
+            </a:r>
+            <a:endParaRPr lang="sk-SK" sz="1100" dirty="0"/>
+          </a:p>
+        </p:txBody>
       </p:sp>
     </p:spTree>
     <p:extLst>

</xml_diff>